<commit_message>
smaller area in mac
</commit_message>
<xml_diff>
--- a/ppt/0527.pptx
+++ b/ppt/0527.pptx
@@ -5,7 +5,7 @@
     <p:sldMasterId id="2147483660" r:id="rId1"/>
   </p:sldMasterIdLst>
   <p:notesMasterIdLst>
-    <p:notesMasterId r:id="rId12"/>
+    <p:notesMasterId r:id="rId13"/>
   </p:notesMasterIdLst>
   <p:sldIdLst>
     <p:sldId id="256" r:id="rId2"/>
@@ -18,6 +18,7 @@
     <p:sldId id="339" r:id="rId9"/>
     <p:sldId id="326" r:id="rId10"/>
     <p:sldId id="340" r:id="rId11"/>
+    <p:sldId id="341" r:id="rId12"/>
   </p:sldIdLst>
   <p:sldSz cx="12192000" cy="6858000"/>
   <p:notesSz cx="6858000" cy="9144000"/>
@@ -206,7 +207,7 @@
           <a:p>
             <a:fld id="{FEE5F619-DF5E-416B-B866-5F6697AABCEE}" type="datetimeFigureOut">
               <a:rPr lang="zh-TW" altLang="en-US" smtClean="0"/>
-              <a:t>2025/5/26</a:t>
+              <a:t>2025/5/27</a:t>
             </a:fld>
             <a:endParaRPr lang="zh-TW" altLang="en-US"/>
           </a:p>
@@ -642,7 +643,7 @@
           <a:p>
             <a:fld id="{B5CC9422-2511-4DEB-8886-B5AD4CD25B7D}" type="datetime1">
               <a:rPr lang="zh-TW" altLang="en-US" smtClean="0"/>
-              <a:t>2025/5/26</a:t>
+              <a:t>2025/5/27</a:t>
             </a:fld>
             <a:endParaRPr lang="zh-TW" altLang="en-US"/>
           </a:p>
@@ -972,7 +973,7 @@
           <a:p>
             <a:fld id="{B6DDFE32-2043-4B95-8CEA-949D1D532E89}" type="datetime1">
               <a:rPr lang="zh-TW" altLang="en-US" smtClean="0"/>
-              <a:t>2025/5/26</a:t>
+              <a:t>2025/5/27</a:t>
             </a:fld>
             <a:endParaRPr lang="zh-TW" altLang="en-US"/>
           </a:p>
@@ -1152,7 +1153,7 @@
           <a:p>
             <a:fld id="{207C0BCD-8E35-4E36-BA70-DF8CCEC4F900}" type="datetime1">
               <a:rPr lang="zh-TW" altLang="en-US" smtClean="0"/>
-              <a:t>2025/5/26</a:t>
+              <a:t>2025/5/27</a:t>
             </a:fld>
             <a:endParaRPr lang="zh-TW" altLang="en-US"/>
           </a:p>
@@ -1361,7 +1362,7 @@
           <a:p>
             <a:fld id="{D12744AA-2124-42E6-AA52-9077A6A76493}" type="datetime1">
               <a:rPr lang="zh-TW" altLang="en-US" smtClean="0"/>
-              <a:t>2025/5/26</a:t>
+              <a:t>2025/5/27</a:t>
             </a:fld>
             <a:endParaRPr lang="zh-TW" altLang="en-US"/>
           </a:p>
@@ -1638,7 +1639,7 @@
           <a:p>
             <a:fld id="{1E2A031D-4FFA-4B7E-B90B-3B0E99D95905}" type="datetime1">
               <a:rPr lang="zh-TW" altLang="en-US" smtClean="0"/>
-              <a:t>2025/5/26</a:t>
+              <a:t>2025/5/27</a:t>
             </a:fld>
             <a:endParaRPr lang="zh-TW" altLang="en-US"/>
           </a:p>
@@ -2032,7 +2033,7 @@
           <a:p>
             <a:fld id="{D963E789-9038-455D-87FB-B3612E9AC9A3}" type="datetime1">
               <a:rPr lang="zh-TW" altLang="en-US" smtClean="0"/>
-              <a:t>2025/5/26</a:t>
+              <a:t>2025/5/27</a:t>
             </a:fld>
             <a:endParaRPr lang="zh-TW" altLang="en-US"/>
           </a:p>
@@ -2509,7 +2510,7 @@
           <a:p>
             <a:fld id="{1AE525C3-42CF-4363-9956-46937FDA7220}" type="datetime1">
               <a:rPr lang="zh-TW" altLang="en-US" smtClean="0"/>
-              <a:t>2025/5/26</a:t>
+              <a:t>2025/5/27</a:t>
             </a:fld>
             <a:endParaRPr lang="zh-TW" altLang="en-US"/>
           </a:p>
@@ -2627,7 +2628,7 @@
           <a:p>
             <a:fld id="{4675F6D4-C983-4750-ACFD-FFD733A8AEBA}" type="datetime1">
               <a:rPr lang="zh-TW" altLang="en-US" smtClean="0"/>
-              <a:t>2025/5/26</a:t>
+              <a:t>2025/5/27</a:t>
             </a:fld>
             <a:endParaRPr lang="zh-TW" altLang="en-US"/>
           </a:p>
@@ -2722,7 +2723,7 @@
           <a:p>
             <a:fld id="{956BF6A0-178A-49B5-817C-3A928D943E2A}" type="datetime1">
               <a:rPr lang="zh-TW" altLang="en-US" smtClean="0"/>
-              <a:t>2025/5/26</a:t>
+              <a:t>2025/5/27</a:t>
             </a:fld>
             <a:endParaRPr lang="zh-TW" altLang="en-US"/>
           </a:p>
@@ -3068,7 +3069,7 @@
           <a:p>
             <a:fld id="{FFA7AC8A-5481-4A69-A182-F9F960B32A4D}" type="datetime1">
               <a:rPr lang="zh-TW" altLang="en-US" smtClean="0"/>
-              <a:t>2025/5/26</a:t>
+              <a:t>2025/5/27</a:t>
             </a:fld>
             <a:endParaRPr lang="zh-TW" altLang="en-US"/>
           </a:p>
@@ -3456,7 +3457,7 @@
           <a:p>
             <a:fld id="{FFD0E206-1C27-4E41-AC82-7A0AA2282A21}" type="datetime1">
               <a:rPr lang="zh-TW" altLang="en-US" smtClean="0"/>
-              <a:t>2025/5/26</a:t>
+              <a:t>2025/5/27</a:t>
             </a:fld>
             <a:endParaRPr lang="zh-TW" altLang="en-US"/>
           </a:p>
@@ -3738,7 +3739,7 @@
             <a:fld id="{B73B85AF-FB41-4DE2-B200-20D62EB52EF6}" type="datetime1">
               <a:rPr lang="zh-TW" altLang="en-US" smtClean="0"/>
               <a:pPr/>
-              <a:t>2025/5/26</a:t>
+              <a:t>2025/5/27</a:t>
             </a:fld>
             <a:endParaRPr lang="zh-TW" altLang="en-US"/>
           </a:p>
@@ -4341,7 +4342,7 @@
                 <a:latin typeface="Times New Roman" panose="02020603050405020304" pitchFamily="18" charset="0"/>
                 <a:cs typeface="Times New Roman" panose="02020603050405020304" pitchFamily="18" charset="0"/>
               </a:rPr>
-              <a:t>2025/5/26</a:t>
+              <a:t>2025/5/27</a:t>
             </a:fld>
             <a:endParaRPr lang="zh-TW" altLang="en-US" sz="1600" dirty="0">
               <a:latin typeface="Times New Roman" panose="02020603050405020304" pitchFamily="18" charset="0"/>
@@ -4771,7 +4772,7 @@
           <a:p>
             <a:r>
               <a:rPr lang="en-US" altLang="zh-TW" dirty="0"/>
-              <a:t>Optimizing each MAC: LUT</a:t>
+              <a:t>Optimizing each MAC: adder tree</a:t>
             </a:r>
             <a:endParaRPr lang="zh-TW" altLang="en-US" dirty="0"/>
           </a:p>
@@ -4799,8 +4800,8 @@
         </p:blipFill>
         <p:spPr>
           <a:xfrm>
-            <a:off x="2769441" y="2962292"/>
-            <a:ext cx="7443039" cy="3209908"/>
+            <a:off x="2332038" y="2757686"/>
+            <a:ext cx="7527923" cy="3246515"/>
           </a:xfrm>
           <a:prstGeom prst="rect">
             <a:avLst/>
@@ -4811,6 +4812,189 @@
     <p:extLst>
       <p:ext uri="{BB962C8B-B14F-4D97-AF65-F5344CB8AC3E}">
         <p14:creationId xmlns:p14="http://schemas.microsoft.com/office/powerpoint/2010/main" val="2370581871"/>
+      </p:ext>
+    </p:extLst>
+  </p:cSld>
+  <p:clrMapOvr>
+    <a:masterClrMapping/>
+  </p:clrMapOvr>
+</p:sld>
+</file>
+
+<file path=ppt/slides/slide11.xml><?xml version="1.0" encoding="utf-8"?>
+<p:sld xmlns:a="http://schemas.openxmlformats.org/drawingml/2006/main" xmlns:r="http://schemas.openxmlformats.org/officeDocument/2006/relationships" xmlns:p="http://schemas.openxmlformats.org/presentationml/2006/main">
+  <p:cSld>
+    <p:spTree>
+      <p:nvGrpSpPr>
+        <p:cNvPr id="1" name=""/>
+        <p:cNvGrpSpPr/>
+        <p:nvPr/>
+      </p:nvGrpSpPr>
+      <p:grpSpPr>
+        <a:xfrm>
+          <a:off x="0" y="0"/>
+          <a:ext cx="0" cy="0"/>
+          <a:chOff x="0" y="0"/>
+          <a:chExt cx="0" cy="0"/>
+        </a:xfrm>
+      </p:grpSpPr>
+      <p:sp>
+        <p:nvSpPr>
+          <p:cNvPr id="2" name="標題 1">
+            <a:extLst>
+              <a:ext uri="{FF2B5EF4-FFF2-40B4-BE49-F238E27FC236}">
+                <a16:creationId xmlns:a16="http://schemas.microsoft.com/office/drawing/2014/main" id="{3AAFAAE1-BAE4-4855-95BE-8CC6A9F33C0B}"/>
+              </a:ext>
+            </a:extLst>
+          </p:cNvPr>
+          <p:cNvSpPr>
+            <a:spLocks noGrp="1"/>
+          </p:cNvSpPr>
+          <p:nvPr>
+            <p:ph type="title"/>
+          </p:nvPr>
+        </p:nvSpPr>
+        <p:spPr/>
+        <p:txBody>
+          <a:bodyPr/>
+          <a:lstStyle/>
+          <a:p>
+            <a:r>
+              <a:rPr lang="en-US" altLang="zh-TW" dirty="0"/>
+              <a:t>Synthesis</a:t>
+            </a:r>
+            <a:endParaRPr lang="zh-TW" altLang="en-US" dirty="0"/>
+          </a:p>
+        </p:txBody>
+      </p:sp>
+      <p:sp>
+        <p:nvSpPr>
+          <p:cNvPr id="4" name="日期版面配置區 3">
+            <a:extLst>
+              <a:ext uri="{FF2B5EF4-FFF2-40B4-BE49-F238E27FC236}">
+                <a16:creationId xmlns:a16="http://schemas.microsoft.com/office/drawing/2014/main" id="{9106CD2E-186F-4469-BA01-0D04FFED9E32}"/>
+              </a:ext>
+            </a:extLst>
+          </p:cNvPr>
+          <p:cNvSpPr>
+            <a:spLocks noGrp="1"/>
+          </p:cNvSpPr>
+          <p:nvPr>
+            <p:ph type="dt" sz="half" idx="10"/>
+          </p:nvPr>
+        </p:nvSpPr>
+        <p:spPr/>
+        <p:txBody>
+          <a:bodyPr/>
+          <a:lstStyle/>
+          <a:p>
+            <a:fld id="{D12744AA-2124-42E6-AA52-9077A6A76493}" type="datetime1">
+              <a:rPr lang="zh-TW" altLang="en-US" smtClean="0"/>
+              <a:t>2025/5/27</a:t>
+            </a:fld>
+            <a:endParaRPr lang="zh-TW" altLang="en-US"/>
+          </a:p>
+        </p:txBody>
+      </p:sp>
+      <p:sp>
+        <p:nvSpPr>
+          <p:cNvPr id="5" name="投影片編號版面配置區 4">
+            <a:extLst>
+              <a:ext uri="{FF2B5EF4-FFF2-40B4-BE49-F238E27FC236}">
+                <a16:creationId xmlns:a16="http://schemas.microsoft.com/office/drawing/2014/main" id="{10CD63D3-8EE8-456A-AD7C-5D5832D7514D}"/>
+              </a:ext>
+            </a:extLst>
+          </p:cNvPr>
+          <p:cNvSpPr>
+            <a:spLocks noGrp="1"/>
+          </p:cNvSpPr>
+          <p:nvPr>
+            <p:ph type="sldNum" sz="quarter" idx="12"/>
+          </p:nvPr>
+        </p:nvSpPr>
+        <p:spPr/>
+        <p:txBody>
+          <a:bodyPr/>
+          <a:lstStyle/>
+          <a:p>
+            <a:fld id="{13D67497-B2F6-4681-B86D-28F94DA14DA8}" type="slidenum">
+              <a:rPr lang="zh-TW" altLang="en-US" smtClean="0"/>
+              <a:t>11</a:t>
+            </a:fld>
+            <a:endParaRPr lang="zh-TW" altLang="en-US" dirty="0"/>
+          </a:p>
+        </p:txBody>
+      </p:sp>
+      <p:sp>
+        <p:nvSpPr>
+          <p:cNvPr id="14" name="內容版面配置區 13">
+            <a:extLst>
+              <a:ext uri="{FF2B5EF4-FFF2-40B4-BE49-F238E27FC236}">
+                <a16:creationId xmlns:a16="http://schemas.microsoft.com/office/drawing/2014/main" id="{820E01B9-83F7-4848-9B15-A11BA7F116C1}"/>
+              </a:ext>
+            </a:extLst>
+          </p:cNvPr>
+          <p:cNvSpPr>
+            <a:spLocks noGrp="1"/>
+          </p:cNvSpPr>
+          <p:nvPr>
+            <p:ph idx="1"/>
+          </p:nvPr>
+        </p:nvSpPr>
+        <p:spPr>
+          <a:xfrm>
+            <a:off x="1371600" y="1798115"/>
+            <a:ext cx="10589243" cy="4069285"/>
+          </a:xfrm>
+        </p:spPr>
+        <p:txBody>
+          <a:bodyPr>
+            <a:normAutofit/>
+          </a:bodyPr>
+          <a:lstStyle/>
+          <a:p>
+            <a:r>
+              <a:rPr lang="en-US" altLang="zh-TW" dirty="0"/>
+              <a:t>Optimizing each MAC: adder tree</a:t>
+            </a:r>
+            <a:endParaRPr lang="zh-TW" altLang="en-US" dirty="0"/>
+          </a:p>
+        </p:txBody>
+      </p:sp>
+      <p:pic>
+        <p:nvPicPr>
+          <p:cNvPr id="7" name="圖片 6">
+            <a:extLst>
+              <a:ext uri="{FF2B5EF4-FFF2-40B4-BE49-F238E27FC236}">
+                <a16:creationId xmlns:a16="http://schemas.microsoft.com/office/drawing/2014/main" id="{7AF8DA92-928D-47DA-A308-7383A968F5BC}"/>
+              </a:ext>
+            </a:extLst>
+          </p:cNvPr>
+          <p:cNvPicPr>
+            <a:picLocks noChangeAspect="1"/>
+          </p:cNvPicPr>
+          <p:nvPr/>
+        </p:nvPicPr>
+        <p:blipFill>
+          <a:blip r:embed="rId2"/>
+          <a:stretch>
+            <a:fillRect/>
+          </a:stretch>
+        </p:blipFill>
+        <p:spPr>
+          <a:xfrm>
+            <a:off x="2497432" y="2673432"/>
+            <a:ext cx="7673470" cy="3437281"/>
+          </a:xfrm>
+          <a:prstGeom prst="rect">
+            <a:avLst/>
+          </a:prstGeom>
+        </p:spPr>
+      </p:pic>
+    </p:spTree>
+    <p:extLst>
+      <p:ext uri="{BB962C8B-B14F-4D97-AF65-F5344CB8AC3E}">
+        <p14:creationId xmlns:p14="http://schemas.microsoft.com/office/powerpoint/2010/main" val="2690659406"/>
       </p:ext>
     </p:extLst>
   </p:cSld>
@@ -4930,7 +5114,7 @@
           <a:p>
             <a:fld id="{D12744AA-2124-42E6-AA52-9077A6A76493}" type="datetime1">
               <a:rPr lang="zh-TW" altLang="en-US" smtClean="0"/>
-              <a:t>2025/5/26</a:t>
+              <a:t>2025/5/27</a:t>
             </a:fld>
             <a:endParaRPr lang="zh-TW" altLang="en-US"/>
           </a:p>
@@ -5082,7 +5266,7 @@
           <a:p>
             <a:fld id="{D12744AA-2124-42E6-AA52-9077A6A76493}" type="datetime1">
               <a:rPr lang="zh-TW" altLang="en-US" smtClean="0"/>
-              <a:t>2025/5/26</a:t>
+              <a:t>2025/5/27</a:t>
             </a:fld>
             <a:endParaRPr lang="zh-TW" altLang="en-US"/>
           </a:p>
@@ -6161,7 +6345,7 @@
           <a:p>
             <a:fld id="{D12744AA-2124-42E6-AA52-9077A6A76493}" type="datetime1">
               <a:rPr lang="zh-TW" altLang="en-US" smtClean="0"/>
-              <a:t>2025/5/26</a:t>
+              <a:t>2025/5/27</a:t>
             </a:fld>
             <a:endParaRPr lang="zh-TW" altLang="en-US"/>
           </a:p>
@@ -6343,7 +6527,7 @@
           <a:p>
             <a:fld id="{D12744AA-2124-42E6-AA52-9077A6A76493}" type="datetime1">
               <a:rPr lang="zh-TW" altLang="en-US" smtClean="0"/>
-              <a:t>2025/5/26</a:t>
+              <a:t>2025/5/27</a:t>
             </a:fld>
             <a:endParaRPr lang="zh-TW" altLang="en-US"/>
           </a:p>
@@ -7794,8 +7978,8 @@
           </a:p>
         </p:txBody>
       </p:sp>
-      <mc:AlternateContent xmlns:mc="http://schemas.openxmlformats.org/markup-compatibility/2006">
-        <mc:Choice xmlns:a14="http://schemas.microsoft.com/office/drawing/2010/main" Requires="a14">
+      <mc:AlternateContent xmlns:mc="http://schemas.openxmlformats.org/markup-compatibility/2006" xmlns:a14="http://schemas.microsoft.com/office/drawing/2010/main">
+        <mc:Choice Requires="a14">
           <p:sp>
             <p:nvSpPr>
               <p:cNvPr id="3" name="內容版面配置區 2">
@@ -8174,7 +8358,7 @@
             </p:txBody>
           </p:sp>
         </mc:Choice>
-        <mc:Fallback>
+        <mc:Fallback xmlns="">
           <p:sp>
             <p:nvSpPr>
               <p:cNvPr id="3" name="內容版面配置區 2">
@@ -8417,8 +8601,8 @@
           </a:p>
         </p:txBody>
       </p:sp>
-      <mc:AlternateContent xmlns:mc="http://schemas.openxmlformats.org/markup-compatibility/2006">
-        <mc:Choice xmlns:a14="http://schemas.microsoft.com/office/drawing/2010/main" Requires="a14">
+      <mc:AlternateContent xmlns:mc="http://schemas.openxmlformats.org/markup-compatibility/2006" xmlns:a14="http://schemas.microsoft.com/office/drawing/2010/main">
+        <mc:Choice Requires="a14">
           <p:sp>
             <p:nvSpPr>
               <p:cNvPr id="3" name="內容版面配置區 2">
@@ -8488,13 +8672,7 @@
                           <a:rPr lang="en-US" altLang="zh-TW" i="1" dirty="0">
                             <a:latin typeface="Cambria Math" panose="02040503050406030204" pitchFamily="18" charset="0"/>
                           </a:rPr>
-                          <m:t>2</m:t>
-                        </m:r>
-                        <m:r>
-                          <a:rPr lang="en-US" altLang="zh-TW" i="1" dirty="0">
-                            <a:latin typeface="Cambria Math" panose="02040503050406030204" pitchFamily="18" charset="0"/>
-                          </a:rPr>
-                          <m:t>4</m:t>
+                          <m:t>24</m:t>
                         </m:r>
                       </m:sup>
                     </m:sSup>
@@ -8523,7 +8701,7 @@
             </p:txBody>
           </p:sp>
         </mc:Choice>
-        <mc:Fallback>
+        <mc:Fallback xmlns="">
           <p:sp>
             <p:nvSpPr>
               <p:cNvPr id="3" name="內容版面配置區 2">

</xml_diff>